<commit_message>
Fixed create-user bug and edited PPP and documentation
</commit_message>
<xml_diff>
--- a/docs/diagrams/LoginFeatureLogicModelComponent.pptx
+++ b/docs/diagrams/LoginFeatureLogicModelComponent.pptx
@@ -197,7 +197,7 @@
           <a:p>
             <a:fld id="{5C928CE9-EAE4-F44F-B167-0307162EC1FB}" type="datetimeFigureOut">
               <a:rPr lang="en-US" smtClean="0"/>
-              <a:t>4/4/18</a:t>
+              <a:t>4/12/18</a:t>
             </a:fld>
             <a:endParaRPr lang="en-US"/>
           </a:p>
@@ -595,7 +595,7 @@
           <a:p>
             <a:fld id="{F9CB7A9D-6CFE-BC45-BA6E-9AFBAFC923BD}" type="datetimeFigureOut">
               <a:rPr lang="en-US" smtClean="0"/>
-              <a:t>4/4/18</a:t>
+              <a:t>4/12/18</a:t>
             </a:fld>
             <a:endParaRPr lang="en-US"/>
           </a:p>
@@ -765,7 +765,7 @@
           <a:p>
             <a:fld id="{F9CB7A9D-6CFE-BC45-BA6E-9AFBAFC923BD}" type="datetimeFigureOut">
               <a:rPr lang="en-US" smtClean="0"/>
-              <a:t>4/4/18</a:t>
+              <a:t>4/12/18</a:t>
             </a:fld>
             <a:endParaRPr lang="en-US"/>
           </a:p>
@@ -945,7 +945,7 @@
           <a:p>
             <a:fld id="{F9CB7A9D-6CFE-BC45-BA6E-9AFBAFC923BD}" type="datetimeFigureOut">
               <a:rPr lang="en-US" smtClean="0"/>
-              <a:t>4/4/18</a:t>
+              <a:t>4/12/18</a:t>
             </a:fld>
             <a:endParaRPr lang="en-US"/>
           </a:p>
@@ -1115,7 +1115,7 @@
           <a:p>
             <a:fld id="{F9CB7A9D-6CFE-BC45-BA6E-9AFBAFC923BD}" type="datetimeFigureOut">
               <a:rPr lang="en-US" smtClean="0"/>
-              <a:t>4/4/18</a:t>
+              <a:t>4/12/18</a:t>
             </a:fld>
             <a:endParaRPr lang="en-US"/>
           </a:p>
@@ -1361,7 +1361,7 @@
           <a:p>
             <a:fld id="{F9CB7A9D-6CFE-BC45-BA6E-9AFBAFC923BD}" type="datetimeFigureOut">
               <a:rPr lang="en-US" smtClean="0"/>
-              <a:t>4/4/18</a:t>
+              <a:t>4/12/18</a:t>
             </a:fld>
             <a:endParaRPr lang="en-US"/>
           </a:p>
@@ -1593,7 +1593,7 @@
           <a:p>
             <a:fld id="{F9CB7A9D-6CFE-BC45-BA6E-9AFBAFC923BD}" type="datetimeFigureOut">
               <a:rPr lang="en-US" smtClean="0"/>
-              <a:t>4/4/18</a:t>
+              <a:t>4/12/18</a:t>
             </a:fld>
             <a:endParaRPr lang="en-US"/>
           </a:p>
@@ -1960,7 +1960,7 @@
           <a:p>
             <a:fld id="{F9CB7A9D-6CFE-BC45-BA6E-9AFBAFC923BD}" type="datetimeFigureOut">
               <a:rPr lang="en-US" smtClean="0"/>
-              <a:t>4/4/18</a:t>
+              <a:t>4/12/18</a:t>
             </a:fld>
             <a:endParaRPr lang="en-US"/>
           </a:p>
@@ -2078,7 +2078,7 @@
           <a:p>
             <a:fld id="{F9CB7A9D-6CFE-BC45-BA6E-9AFBAFC923BD}" type="datetimeFigureOut">
               <a:rPr lang="en-US" smtClean="0"/>
-              <a:t>4/4/18</a:t>
+              <a:t>4/12/18</a:t>
             </a:fld>
             <a:endParaRPr lang="en-US"/>
           </a:p>
@@ -2173,7 +2173,7 @@
           <a:p>
             <a:fld id="{F9CB7A9D-6CFE-BC45-BA6E-9AFBAFC923BD}" type="datetimeFigureOut">
               <a:rPr lang="en-US" smtClean="0"/>
-              <a:t>4/4/18</a:t>
+              <a:t>4/12/18</a:t>
             </a:fld>
             <a:endParaRPr lang="en-US"/>
           </a:p>
@@ -2450,7 +2450,7 @@
           <a:p>
             <a:fld id="{F9CB7A9D-6CFE-BC45-BA6E-9AFBAFC923BD}" type="datetimeFigureOut">
               <a:rPr lang="en-US" smtClean="0"/>
-              <a:t>4/4/18</a:t>
+              <a:t>4/12/18</a:t>
             </a:fld>
             <a:endParaRPr lang="en-US"/>
           </a:p>
@@ -2707,7 +2707,7 @@
           <a:p>
             <a:fld id="{F9CB7A9D-6CFE-BC45-BA6E-9AFBAFC923BD}" type="datetimeFigureOut">
               <a:rPr lang="en-US" smtClean="0"/>
-              <a:t>4/4/18</a:t>
+              <a:t>4/12/18</a:t>
             </a:fld>
             <a:endParaRPr lang="en-US"/>
           </a:p>
@@ -2920,7 +2920,7 @@
           <a:p>
             <a:fld id="{F9CB7A9D-6CFE-BC45-BA6E-9AFBAFC923BD}" type="datetimeFigureOut">
               <a:rPr lang="en-US" smtClean="0"/>
-              <a:t>4/4/18</a:t>
+              <a:t>4/12/18</a:t>
             </a:fld>
             <a:endParaRPr lang="en-US"/>
           </a:p>
@@ -3325,69 +3325,6 @@
           <a:chExt cx="0" cy="0"/>
         </a:xfrm>
       </p:grpSpPr>
-      <p:sp>
-        <p:nvSpPr>
-          <p:cNvPr id="106" name="Rounded Rectangle 105">
-            <a:extLst>
-              <a:ext uri="{FF2B5EF4-FFF2-40B4-BE49-F238E27FC236}">
-                <a16:creationId xmlns:a16="http://schemas.microsoft.com/office/drawing/2014/main" id="{E65C18FA-945E-8F43-953A-2CAFB3404A8C}"/>
-              </a:ext>
-            </a:extLst>
-          </p:cNvPr>
-          <p:cNvSpPr/>
-          <p:nvPr/>
-        </p:nvSpPr>
-        <p:spPr>
-          <a:xfrm>
-            <a:off x="16878422" y="3057950"/>
-            <a:ext cx="7540149" cy="5849602"/>
-          </a:xfrm>
-          <a:prstGeom prst="roundRect">
-            <a:avLst/>
-          </a:prstGeom>
-          <a:solidFill>
-            <a:srgbClr val="7030A0">
-              <a:alpha val="20000"/>
-            </a:srgbClr>
-          </a:solidFill>
-          <a:ln>
-            <a:solidFill>
-              <a:srgbClr val="7030A0">
-                <a:alpha val="20000"/>
-              </a:srgbClr>
-            </a:solidFill>
-          </a:ln>
-        </p:spPr>
-        <p:style>
-          <a:lnRef idx="2">
-            <a:schemeClr val="accent1">
-              <a:shade val="50000"/>
-            </a:schemeClr>
-          </a:lnRef>
-          <a:fillRef idx="1">
-            <a:schemeClr val="accent1"/>
-          </a:fillRef>
-          <a:effectRef idx="0">
-            <a:schemeClr val="accent1"/>
-          </a:effectRef>
-          <a:fontRef idx="minor">
-            <a:schemeClr val="lt1"/>
-          </a:fontRef>
-        </p:style>
-        <p:txBody>
-          <a:bodyPr rot="0" spcFirstLastPara="0" vertOverflow="overflow" horzOverflow="overflow" vert="horz" wrap="square" lIns="91440" tIns="45720" rIns="91440" bIns="45720" numCol="1" spcCol="0" rtlCol="0" fromWordArt="0" anchor="ctr" anchorCtr="0" forceAA="0" compatLnSpc="1">
-            <a:prstTxWarp prst="textNoShape">
-              <a:avLst/>
-            </a:prstTxWarp>
-            <a:noAutofit/>
-          </a:bodyPr>
-          <a:lstStyle/>
-          <a:p>
-            <a:pPr algn="ctr"/>
-            <a:endParaRPr lang="en-US"/>
-          </a:p>
-        </p:txBody>
-      </p:sp>
       <p:cxnSp>
         <p:nvCxnSpPr>
           <p:cNvPr id="31" name="Straight Connector 30">
@@ -3444,8 +3381,8 @@
         </p:nvSpPr>
         <p:spPr>
           <a:xfrm>
-            <a:off x="2668600" y="1520939"/>
-            <a:ext cx="14029577" cy="7728857"/>
+            <a:off x="2743200" y="1210963"/>
+            <a:ext cx="13954977" cy="8038834"/>
           </a:xfrm>
           <a:prstGeom prst="roundRect">
             <a:avLst/>
@@ -3547,14 +3484,14 @@
           <a:p>
             <a:pPr algn="ctr"/>
             <a:r>
-              <a:rPr lang="en-US" sz="2658" dirty="0"/>
+              <a:rPr lang="en-US" sz="2658" b="1" dirty="0"/>
               <a:t>:</a:t>
             </a:r>
             <a:r>
-              <a:rPr lang="en-US" sz="2658" dirty="0" err="1"/>
+              <a:rPr lang="en-US" sz="2658" b="1" dirty="0" err="1"/>
               <a:t>LogicManager</a:t>
             </a:r>
-            <a:endParaRPr lang="en-US" sz="2658" dirty="0"/>
+            <a:endParaRPr lang="en-US" sz="2658" b="1" dirty="0"/>
           </a:p>
         </p:txBody>
       </p:sp>
@@ -3707,8 +3644,8 @@
         </p:nvSpPr>
         <p:spPr>
           <a:xfrm>
-            <a:off x="435429" y="2963730"/>
-            <a:ext cx="4150116" cy="461665"/>
+            <a:off x="435428" y="2963730"/>
+            <a:ext cx="4341377" cy="461665"/>
           </a:xfrm>
           <a:prstGeom prst="rect">
             <a:avLst/>
@@ -3722,7 +3659,11 @@
           <a:lstStyle/>
           <a:p>
             <a:r>
-              <a:rPr lang="en-US" sz="2400" dirty="0"/>
+              <a:rPr lang="en-US" sz="2400" b="1" dirty="0">
+                <a:solidFill>
+                  <a:schemeClr val="accent1"/>
+                </a:solidFill>
+              </a:rPr>
               <a:t>execute(“login u/user p/pass”) </a:t>
             </a:r>
           </a:p>
@@ -3824,17 +3765,17 @@
           <a:p>
             <a:pPr algn="ctr"/>
             <a:r>
-              <a:rPr lang="en-US" sz="2658" dirty="0"/>
+              <a:rPr lang="en-US" sz="2658" b="1" dirty="0"/>
               <a:t>:Address</a:t>
             </a:r>
           </a:p>
           <a:p>
             <a:pPr algn="ctr"/>
             <a:r>
-              <a:rPr lang="en-US" sz="2658" dirty="0" err="1"/>
+              <a:rPr lang="en-US" sz="2658" b="1" dirty="0" err="1"/>
               <a:t>BookParser</a:t>
             </a:r>
-            <a:endParaRPr lang="en-US" sz="2658" dirty="0"/>
+            <a:endParaRPr lang="en-US" sz="2658" b="1" dirty="0"/>
           </a:p>
         </p:txBody>
       </p:sp>
@@ -3949,7 +3890,7 @@
         <p:spPr>
           <a:xfrm>
             <a:off x="5062886" y="3231052"/>
-            <a:ext cx="3158059" cy="400110"/>
+            <a:ext cx="3303600" cy="400110"/>
           </a:xfrm>
           <a:prstGeom prst="rect">
             <a:avLst/>
@@ -3963,7 +3904,11 @@
           <a:lstStyle/>
           <a:p>
             <a:r>
-              <a:rPr lang="en-US" sz="2000" dirty="0"/>
+              <a:rPr lang="en-US" sz="2000" b="1" dirty="0">
+                <a:solidFill>
+                  <a:schemeClr val="accent1"/>
+                </a:solidFill>
+              </a:rPr>
               <a:t>parse(“login u/user p/pass”) </a:t>
             </a:r>
           </a:p>
@@ -4067,14 +4012,14 @@
           <a:p>
             <a:pPr algn="ctr"/>
             <a:r>
-              <a:rPr lang="en-US" sz="2658" dirty="0"/>
+              <a:rPr lang="en-US" sz="2658" b="1" dirty="0"/>
               <a:t>:</a:t>
             </a:r>
             <a:r>
-              <a:rPr lang="en-US" sz="2658" dirty="0" err="1"/>
+              <a:rPr lang="en-US" sz="2658" b="1" dirty="0" err="1"/>
               <a:t>LoginCommandParser</a:t>
             </a:r>
-            <a:endParaRPr lang="en-US" sz="2658" dirty="0"/>
+            <a:endParaRPr lang="en-US" sz="2658" b="1" dirty="0"/>
           </a:p>
         </p:txBody>
       </p:sp>
@@ -4370,7 +4315,7 @@
         <p:spPr>
           <a:xfrm>
             <a:off x="8515880" y="4911854"/>
-            <a:ext cx="3158059" cy="400110"/>
+            <a:ext cx="3303600" cy="400110"/>
           </a:xfrm>
           <a:prstGeom prst="rect">
             <a:avLst/>
@@ -4384,7 +4329,11 @@
           <a:lstStyle/>
           <a:p>
             <a:r>
-              <a:rPr lang="en-US" sz="2000" dirty="0"/>
+              <a:rPr lang="en-US" sz="2000" b="1" dirty="0">
+                <a:solidFill>
+                  <a:schemeClr val="accent1"/>
+                </a:solidFill>
+              </a:rPr>
               <a:t>parse(“u/user p/pass”) </a:t>
             </a:r>
           </a:p>
@@ -4444,14 +4393,14 @@
           <a:p>
             <a:pPr algn="ctr"/>
             <a:r>
-              <a:rPr lang="en-US" sz="2658" dirty="0"/>
+              <a:rPr lang="en-US" sz="2658" b="1" dirty="0"/>
               <a:t>:Login</a:t>
             </a:r>
           </a:p>
           <a:p>
             <a:pPr algn="ctr"/>
             <a:r>
-              <a:rPr lang="en-US" sz="2658" dirty="0"/>
+              <a:rPr lang="en-US" sz="2658" b="1" dirty="0"/>
               <a:t>Command</a:t>
             </a:r>
           </a:p>
@@ -4756,8 +4705,8 @@
         </p:nvSpPr>
         <p:spPr>
           <a:xfrm>
-            <a:off x="14477387" y="5305770"/>
-            <a:ext cx="3749842" cy="400110"/>
+            <a:off x="14427959" y="5330484"/>
+            <a:ext cx="3922656" cy="400110"/>
           </a:xfrm>
           <a:prstGeom prst="rect">
             <a:avLst/>
@@ -4771,11 +4720,19 @@
           <a:lstStyle/>
           <a:p>
             <a:r>
-              <a:rPr lang="en-US" sz="2000" dirty="0" err="1"/>
+              <a:rPr lang="en-US" sz="2000" b="1" dirty="0" err="1">
+                <a:solidFill>
+                  <a:schemeClr val="accent1"/>
+                </a:solidFill>
+              </a:rPr>
               <a:t>checkLogin</a:t>
             </a:r>
             <a:r>
-              <a:rPr lang="en-US" sz="2000" dirty="0"/>
+              <a:rPr lang="en-US" sz="2000" b="1" dirty="0">
+                <a:solidFill>
+                  <a:schemeClr val="accent1"/>
+                </a:solidFill>
+              </a:rPr>
               <a:t> Credentials(user, pass)</a:t>
             </a:r>
           </a:p>
@@ -4880,14 +4837,14 @@
           <a:p>
             <a:pPr algn="ctr"/>
             <a:r>
-              <a:rPr lang="en-US" sz="2658" dirty="0"/>
+              <a:rPr lang="en-US" sz="2658" b="1" dirty="0"/>
               <a:t>result :</a:t>
             </a:r>
             <a:r>
-              <a:rPr lang="en-US" sz="2658" dirty="0" err="1"/>
+              <a:rPr lang="en-US" sz="2658" b="1" dirty="0" err="1"/>
               <a:t>CommandResult</a:t>
             </a:r>
-            <a:endParaRPr lang="en-US" sz="2658" dirty="0"/>
+            <a:endParaRPr lang="en-US" sz="2658" b="1" dirty="0"/>
           </a:p>
         </p:txBody>
       </p:sp>
@@ -5171,61 +5128,17 @@
           <a:p>
             <a:pPr algn="ctr"/>
             <a:r>
-              <a:rPr lang="en-US" sz="2658" dirty="0"/>
+              <a:rPr lang="en-US" sz="2658" b="1" dirty="0"/>
               <a:t>:</a:t>
             </a:r>
             <a:r>
-              <a:rPr lang="en-US" sz="2658" dirty="0" err="1"/>
+              <a:rPr lang="en-US" sz="2658" b="1" dirty="0" err="1"/>
               <a:t>ModelManager</a:t>
             </a:r>
-            <a:endParaRPr lang="en-US" sz="2658" dirty="0"/>
-          </a:p>
-        </p:txBody>
-      </p:sp>
-      <p:cxnSp>
-        <p:nvCxnSpPr>
-          <p:cNvPr id="93" name="Straight Arrow Connector 92">
-            <a:extLst>
-              <a:ext uri="{FF2B5EF4-FFF2-40B4-BE49-F238E27FC236}">
-                <a16:creationId xmlns:a16="http://schemas.microsoft.com/office/drawing/2014/main" id="{7BB613EA-6D53-8C4A-8722-C3949A715154}"/>
-              </a:ext>
-            </a:extLst>
-          </p:cNvPr>
-          <p:cNvCxnSpPr>
-            <a:cxnSpLocks/>
-          </p:cNvCxnSpPr>
-          <p:nvPr/>
-        </p:nvCxnSpPr>
-        <p:spPr>
-          <a:xfrm>
-            <a:off x="18400043" y="5940018"/>
-            <a:ext cx="3632240" cy="0"/>
-          </a:xfrm>
-          <a:prstGeom prst="straightConnector1">
-            <a:avLst/>
-          </a:prstGeom>
-          <a:ln w="38100">
-            <a:solidFill>
-              <a:srgbClr val="7030A0"/>
-            </a:solidFill>
-            <a:tailEnd type="triangle"/>
-          </a:ln>
-        </p:spPr>
-        <p:style>
-          <a:lnRef idx="1">
-            <a:schemeClr val="accent1"/>
-          </a:lnRef>
-          <a:fillRef idx="0">
-            <a:schemeClr val="accent1"/>
-          </a:fillRef>
-          <a:effectRef idx="0">
-            <a:schemeClr val="accent1"/>
-          </a:effectRef>
-          <a:fontRef idx="minor">
-            <a:schemeClr val="tx1"/>
-          </a:fontRef>
-        </p:style>
-      </p:cxnSp>
+            <a:endParaRPr lang="en-US" sz="2658" b="1" dirty="0"/>
+          </a:p>
+        </p:txBody>
+      </p:sp>
       <p:cxnSp>
         <p:nvCxnSpPr>
           <p:cNvPr id="94" name="Straight Connector 93">
@@ -5327,299 +5240,6 @@
           </a:p>
         </p:txBody>
       </p:sp>
-      <p:cxnSp>
-        <p:nvCxnSpPr>
-          <p:cNvPr id="96" name="Straight Arrow Connector 95">
-            <a:extLst>
-              <a:ext uri="{FF2B5EF4-FFF2-40B4-BE49-F238E27FC236}">
-                <a16:creationId xmlns:a16="http://schemas.microsoft.com/office/drawing/2014/main" id="{E07239E0-BDB3-3A48-B43F-2B5690B523F2}"/>
-              </a:ext>
-            </a:extLst>
-          </p:cNvPr>
-          <p:cNvCxnSpPr>
-            <a:cxnSpLocks/>
-          </p:cNvCxnSpPr>
-          <p:nvPr/>
-        </p:nvCxnSpPr>
-        <p:spPr>
-          <a:xfrm flipH="1">
-            <a:off x="18468369" y="6365227"/>
-            <a:ext cx="3563914" cy="0"/>
-          </a:xfrm>
-          <a:prstGeom prst="straightConnector1">
-            <a:avLst/>
-          </a:prstGeom>
-          <a:ln w="38100">
-            <a:solidFill>
-              <a:srgbClr val="7030A0"/>
-            </a:solidFill>
-            <a:prstDash val="sysDash"/>
-            <a:tailEnd type="triangle"/>
-          </a:ln>
-        </p:spPr>
-        <p:style>
-          <a:lnRef idx="1">
-            <a:schemeClr val="accent1"/>
-          </a:lnRef>
-          <a:fillRef idx="0">
-            <a:schemeClr val="accent1"/>
-          </a:fillRef>
-          <a:effectRef idx="0">
-            <a:schemeClr val="accent1"/>
-          </a:effectRef>
-          <a:fontRef idx="minor">
-            <a:schemeClr val="tx1"/>
-          </a:fontRef>
-        </p:style>
-      </p:cxnSp>
-      <p:cxnSp>
-        <p:nvCxnSpPr>
-          <p:cNvPr id="97" name="Straight Connector 96">
-            <a:extLst>
-              <a:ext uri="{FF2B5EF4-FFF2-40B4-BE49-F238E27FC236}">
-                <a16:creationId xmlns:a16="http://schemas.microsoft.com/office/drawing/2014/main" id="{1DDC397C-976F-9C40-8D4C-E29EABCA561C}"/>
-              </a:ext>
-            </a:extLst>
-          </p:cNvPr>
-          <p:cNvCxnSpPr>
-            <a:cxnSpLocks/>
-          </p:cNvCxnSpPr>
-          <p:nvPr/>
-        </p:nvCxnSpPr>
-        <p:spPr>
-          <a:xfrm>
-            <a:off x="22218211" y="5529415"/>
-            <a:ext cx="0" cy="3072112"/>
-          </a:xfrm>
-          <a:prstGeom prst="line">
-            <a:avLst/>
-          </a:prstGeom>
-          <a:ln>
-            <a:solidFill>
-              <a:srgbClr val="7030A0"/>
-            </a:solidFill>
-            <a:prstDash val="lgDash"/>
-          </a:ln>
-        </p:spPr>
-        <p:style>
-          <a:lnRef idx="1">
-            <a:schemeClr val="accent1"/>
-          </a:lnRef>
-          <a:fillRef idx="0">
-            <a:schemeClr val="accent1"/>
-          </a:fillRef>
-          <a:effectRef idx="0">
-            <a:schemeClr val="accent1"/>
-          </a:effectRef>
-          <a:fontRef idx="minor">
-            <a:schemeClr val="tx1"/>
-          </a:fontRef>
-        </p:style>
-      </p:cxnSp>
-      <p:sp>
-        <p:nvSpPr>
-          <p:cNvPr id="98" name="Rectangle 97">
-            <a:extLst>
-              <a:ext uri="{FF2B5EF4-FFF2-40B4-BE49-F238E27FC236}">
-                <a16:creationId xmlns:a16="http://schemas.microsoft.com/office/drawing/2014/main" id="{67214CA8-C439-834A-8821-B01ED10EC9AD}"/>
-              </a:ext>
-            </a:extLst>
-          </p:cNvPr>
-          <p:cNvSpPr/>
-          <p:nvPr/>
-        </p:nvSpPr>
-        <p:spPr>
-          <a:xfrm>
-            <a:off x="22056516" y="5912651"/>
-            <a:ext cx="359117" cy="474348"/>
-          </a:xfrm>
-          <a:prstGeom prst="rect">
-            <a:avLst/>
-          </a:prstGeom>
-          <a:solidFill>
-            <a:srgbClr val="7030A0"/>
-          </a:solidFill>
-          <a:ln>
-            <a:noFill/>
-          </a:ln>
-        </p:spPr>
-        <p:style>
-          <a:lnRef idx="2">
-            <a:schemeClr val="accent1">
-              <a:shade val="50000"/>
-            </a:schemeClr>
-          </a:lnRef>
-          <a:fillRef idx="1">
-            <a:schemeClr val="accent1"/>
-          </a:fillRef>
-          <a:effectRef idx="0">
-            <a:schemeClr val="accent1"/>
-          </a:effectRef>
-          <a:fontRef idx="minor">
-            <a:schemeClr val="lt1"/>
-          </a:fontRef>
-        </p:style>
-        <p:txBody>
-          <a:bodyPr rot="0" spcFirstLastPara="0" vertOverflow="overflow" horzOverflow="overflow" vert="horz" wrap="square" lIns="135005" tIns="67502" rIns="135005" bIns="67502" numCol="1" spcCol="0" rtlCol="0" fromWordArt="0" anchor="ctr" anchorCtr="0" forceAA="0" compatLnSpc="1">
-            <a:prstTxWarp prst="textNoShape">
-              <a:avLst/>
-            </a:prstTxWarp>
-            <a:noAutofit/>
-          </a:bodyPr>
-          <a:lstStyle/>
-          <a:p>
-            <a:pPr algn="ctr"/>
-            <a:endParaRPr lang="en-US" sz="2658"/>
-          </a:p>
-        </p:txBody>
-      </p:sp>
-      <p:sp>
-        <p:nvSpPr>
-          <p:cNvPr id="99" name="TextBox 98">
-            <a:extLst>
-              <a:ext uri="{FF2B5EF4-FFF2-40B4-BE49-F238E27FC236}">
-                <a16:creationId xmlns:a16="http://schemas.microsoft.com/office/drawing/2014/main" id="{3E0DB1A4-62C9-7D42-BBCD-F69C76993119}"/>
-              </a:ext>
-            </a:extLst>
-          </p:cNvPr>
-          <p:cNvSpPr txBox="1"/>
-          <p:nvPr/>
-        </p:nvSpPr>
-        <p:spPr>
-          <a:xfrm>
-            <a:off x="18468369" y="5498453"/>
-            <a:ext cx="3749842" cy="400110"/>
-          </a:xfrm>
-          <a:prstGeom prst="rect">
-            <a:avLst/>
-          </a:prstGeom>
-          <a:noFill/>
-        </p:spPr>
-        <p:txBody>
-          <a:bodyPr wrap="square" rtlCol="0">
-            <a:spAutoFit/>
-          </a:bodyPr>
-          <a:lstStyle/>
-          <a:p>
-            <a:r>
-              <a:rPr lang="en-US" sz="2000" dirty="0" err="1"/>
-              <a:t>checkLoginCredentials</a:t>
-            </a:r>
-            <a:r>
-              <a:rPr lang="en-US" sz="2000" dirty="0"/>
-              <a:t>(user, pass)</a:t>
-            </a:r>
-          </a:p>
-        </p:txBody>
-      </p:sp>
-      <p:sp>
-        <p:nvSpPr>
-          <p:cNvPr id="100" name="Rectangle 99">
-            <a:extLst>
-              <a:ext uri="{FF2B5EF4-FFF2-40B4-BE49-F238E27FC236}">
-                <a16:creationId xmlns:a16="http://schemas.microsoft.com/office/drawing/2014/main" id="{68B796FC-6C3E-4447-B8E0-2D91FFDCDF68}"/>
-              </a:ext>
-            </a:extLst>
-          </p:cNvPr>
-          <p:cNvSpPr/>
-          <p:nvPr/>
-        </p:nvSpPr>
-        <p:spPr>
-          <a:xfrm>
-            <a:off x="20863820" y="4640648"/>
-            <a:ext cx="2757144" cy="874680"/>
-          </a:xfrm>
-          <a:prstGeom prst="rect">
-            <a:avLst/>
-          </a:prstGeom>
-          <a:solidFill>
-            <a:srgbClr val="7030A0"/>
-          </a:solidFill>
-          <a:ln>
-            <a:noFill/>
-          </a:ln>
-        </p:spPr>
-        <p:style>
-          <a:lnRef idx="2">
-            <a:schemeClr val="accent6">
-              <a:shade val="50000"/>
-            </a:schemeClr>
-          </a:lnRef>
-          <a:fillRef idx="1">
-            <a:schemeClr val="accent6"/>
-          </a:fillRef>
-          <a:effectRef idx="0">
-            <a:schemeClr val="accent6"/>
-          </a:effectRef>
-          <a:fontRef idx="minor">
-            <a:schemeClr val="lt1"/>
-          </a:fontRef>
-        </p:style>
-        <p:txBody>
-          <a:bodyPr rot="0" spcFirstLastPara="0" vertOverflow="overflow" horzOverflow="overflow" vert="horz" wrap="square" lIns="135005" tIns="67502" rIns="135005" bIns="67502" numCol="1" spcCol="0" rtlCol="0" fromWordArt="0" anchor="ctr" anchorCtr="0" forceAA="0" compatLnSpc="1">
-            <a:prstTxWarp prst="textNoShape">
-              <a:avLst/>
-            </a:prstTxWarp>
-            <a:noAutofit/>
-          </a:bodyPr>
-          <a:lstStyle/>
-          <a:p>
-            <a:pPr algn="ctr"/>
-            <a:r>
-              <a:rPr lang="en-US" sz="2658" dirty="0" err="1"/>
-              <a:t>userDatabase</a:t>
-            </a:r>
-            <a:r>
-              <a:rPr lang="en-US" sz="2658" dirty="0"/>
-              <a:t>:</a:t>
-            </a:r>
-          </a:p>
-          <a:p>
-            <a:pPr algn="ctr"/>
-            <a:r>
-              <a:rPr lang="en-US" sz="2658" dirty="0" err="1"/>
-              <a:t>userDatabase</a:t>
-            </a:r>
-            <a:endParaRPr lang="en-US" sz="2658" dirty="0"/>
-          </a:p>
-        </p:txBody>
-      </p:sp>
-      <p:sp>
-        <p:nvSpPr>
-          <p:cNvPr id="101" name="TextBox 100">
-            <a:extLst>
-              <a:ext uri="{FF2B5EF4-FFF2-40B4-BE49-F238E27FC236}">
-                <a16:creationId xmlns:a16="http://schemas.microsoft.com/office/drawing/2014/main" id="{97EA2E4F-2C28-DB49-B5A6-B81F5C1C399F}"/>
-              </a:ext>
-            </a:extLst>
-          </p:cNvPr>
-          <p:cNvSpPr txBox="1"/>
-          <p:nvPr/>
-        </p:nvSpPr>
-        <p:spPr>
-          <a:xfrm>
-            <a:off x="19631734" y="6356258"/>
-            <a:ext cx="1232089" cy="400110"/>
-          </a:xfrm>
-          <a:prstGeom prst="rect">
-            <a:avLst/>
-          </a:prstGeom>
-          <a:noFill/>
-        </p:spPr>
-        <p:txBody>
-          <a:bodyPr wrap="square" rtlCol="0">
-            <a:spAutoFit/>
-          </a:bodyPr>
-          <a:lstStyle/>
-          <a:p>
-            <a:r>
-              <a:rPr lang="en-US" sz="2000" dirty="0" err="1"/>
-              <a:t>boolean</a:t>
-            </a:r>
-            <a:endParaRPr lang="en-US" sz="2000" dirty="0"/>
-          </a:p>
-        </p:txBody>
-      </p:sp>
       <p:sp>
         <p:nvSpPr>
           <p:cNvPr id="102" name="TextBox 101">
@@ -5634,7 +5254,7 @@
         </p:nvSpPr>
         <p:spPr>
           <a:xfrm>
-            <a:off x="15607977" y="5941874"/>
+            <a:off x="15607977" y="5917160"/>
             <a:ext cx="1232089" cy="400110"/>
           </a:xfrm>
           <a:prstGeom prst="rect">
@@ -5649,10 +5269,57 @@
           <a:lstStyle/>
           <a:p>
             <a:r>
-              <a:rPr lang="en-US" sz="2000" dirty="0" err="1"/>
+              <a:rPr lang="en-US" sz="2000" b="1" dirty="0" err="1">
+                <a:solidFill>
+                  <a:srgbClr val="7030A0"/>
+                </a:solidFill>
+              </a:rPr>
               <a:t>boolean</a:t>
             </a:r>
-            <a:endParaRPr lang="en-US" sz="2000" dirty="0"/>
+            <a:endParaRPr lang="en-US" sz="2000" b="1" dirty="0">
+              <a:solidFill>
+                <a:srgbClr val="7030A0"/>
+              </a:solidFill>
+            </a:endParaRPr>
+          </a:p>
+        </p:txBody>
+      </p:sp>
+      <p:sp>
+        <p:nvSpPr>
+          <p:cNvPr id="3" name="TextBox 2">
+            <a:extLst>
+              <a:ext uri="{FF2B5EF4-FFF2-40B4-BE49-F238E27FC236}">
+                <a16:creationId xmlns:a16="http://schemas.microsoft.com/office/drawing/2014/main" id="{394165A2-871F-664E-B809-F7517FC74ADA}"/>
+              </a:ext>
+            </a:extLst>
+          </p:cNvPr>
+          <p:cNvSpPr txBox="1"/>
+          <p:nvPr/>
+        </p:nvSpPr>
+        <p:spPr>
+          <a:xfrm>
+            <a:off x="3674645" y="1337430"/>
+            <a:ext cx="938077" cy="523220"/>
+          </a:xfrm>
+          <a:prstGeom prst="rect">
+            <a:avLst/>
+          </a:prstGeom>
+          <a:noFill/>
+        </p:spPr>
+        <p:txBody>
+          <a:bodyPr wrap="none" rtlCol="0">
+            <a:spAutoFit/>
+          </a:bodyPr>
+          <a:lstStyle/>
+          <a:p>
+            <a:r>
+              <a:rPr lang="en-US" sz="2800" b="1" dirty="0">
+                <a:solidFill>
+                  <a:srgbClr val="0070C0"/>
+                </a:solidFill>
+              </a:rPr>
+              <a:t>Logic</a:t>
+            </a:r>
           </a:p>
         </p:txBody>
       </p:sp>

</xml_diff>